<commit_message>
Ajout d'éléments sur la bdd pour présentation + Correction bug emploi + Export BDD
</commit_message>
<xml_diff>
--- a/Oral 05-05.pptx
+++ b/Oral 05-05.pptx
@@ -923,7 +923,7 @@
           <a:p>
             <a:fld id="{4FEE191A-8D90-4505-B0FF-FDEF0A3BF262}" type="slidenum">
               <a:rPr lang="fr-FR" smtClean="0"/>
-              <a:t>‹#›</a:t>
+              <a:t>‹N°›</a:t>
             </a:fld>
             <a:endParaRPr lang="fr-FR"/>
           </a:p>
@@ -1174,7 +1174,7 @@
           <a:p>
             <a:fld id="{4FEE191A-8D90-4505-B0FF-FDEF0A3BF262}" type="slidenum">
               <a:rPr lang="fr-FR" smtClean="0"/>
-              <a:t>‹#›</a:t>
+              <a:t>‹N°›</a:t>
             </a:fld>
             <a:endParaRPr lang="fr-FR"/>
           </a:p>
@@ -1488,7 +1488,7 @@
           <a:p>
             <a:fld id="{4FEE191A-8D90-4505-B0FF-FDEF0A3BF262}" type="slidenum">
               <a:rPr lang="fr-FR" smtClean="0"/>
-              <a:t>‹#›</a:t>
+              <a:t>‹N°›</a:t>
             </a:fld>
             <a:endParaRPr lang="fr-FR"/>
           </a:p>
@@ -1821,7 +1821,7 @@
           <a:p>
             <a:fld id="{4FEE191A-8D90-4505-B0FF-FDEF0A3BF262}" type="slidenum">
               <a:rPr lang="fr-FR" smtClean="0"/>
-              <a:t>‹#›</a:t>
+              <a:t>‹N°›</a:t>
             </a:fld>
             <a:endParaRPr lang="fr-FR"/>
           </a:p>
@@ -2135,7 +2135,7 @@
           <a:p>
             <a:fld id="{4FEE191A-8D90-4505-B0FF-FDEF0A3BF262}" type="slidenum">
               <a:rPr lang="fr-FR" smtClean="0"/>
-              <a:t>‹#›</a:t>
+              <a:t>‹N°›</a:t>
             </a:fld>
             <a:endParaRPr lang="fr-FR"/>
           </a:p>
@@ -2528,7 +2528,7 @@
           <a:p>
             <a:fld id="{4FEE191A-8D90-4505-B0FF-FDEF0A3BF262}" type="slidenum">
               <a:rPr lang="fr-FR" smtClean="0"/>
-              <a:t>‹#›</a:t>
+              <a:t>‹N°›</a:t>
             </a:fld>
             <a:endParaRPr lang="fr-FR"/>
           </a:p>
@@ -2698,7 +2698,7 @@
           <a:p>
             <a:fld id="{4FEE191A-8D90-4505-B0FF-FDEF0A3BF262}" type="slidenum">
               <a:rPr lang="fr-FR" smtClean="0"/>
-              <a:t>‹#›</a:t>
+              <a:t>‹N°›</a:t>
             </a:fld>
             <a:endParaRPr lang="fr-FR"/>
           </a:p>
@@ -2878,7 +2878,7 @@
           <a:p>
             <a:fld id="{4FEE191A-8D90-4505-B0FF-FDEF0A3BF262}" type="slidenum">
               <a:rPr lang="fr-FR" smtClean="0"/>
-              <a:t>‹#›</a:t>
+              <a:t>‹N°›</a:t>
             </a:fld>
             <a:endParaRPr lang="fr-FR"/>
           </a:p>
@@ -3712,7 +3712,7 @@
                 <a:latin typeface="Trebuchet MS"/>
               </a:rPr>
               <a:pPr/>
-              <a:t>‹#›</a:t>
+              <a:t>‹N°›</a:t>
             </a:fld>
             <a:endParaRPr lang="fr-FR">
               <a:solidFill>
@@ -3915,7 +3915,7 @@
                 <a:latin typeface="Trebuchet MS"/>
               </a:rPr>
               <a:pPr/>
-              <a:t>‹#›</a:t>
+              <a:t>‹N°›</a:t>
             </a:fld>
             <a:endParaRPr lang="fr-FR">
               <a:solidFill>
@@ -4195,7 +4195,7 @@
                 <a:latin typeface="Trebuchet MS"/>
               </a:rPr>
               <a:pPr/>
-              <a:t>‹#›</a:t>
+              <a:t>‹N°›</a:t>
             </a:fld>
             <a:endParaRPr lang="fr-FR">
               <a:solidFill>
@@ -4370,7 +4370,7 @@
           <a:p>
             <a:fld id="{4FEE191A-8D90-4505-B0FF-FDEF0A3BF262}" type="slidenum">
               <a:rPr lang="fr-FR" smtClean="0"/>
-              <a:t>‹#›</a:t>
+              <a:t>‹N°›</a:t>
             </a:fld>
             <a:endParaRPr lang="fr-FR"/>
           </a:p>
@@ -4630,7 +4630,7 @@
                 <a:latin typeface="Trebuchet MS"/>
               </a:rPr>
               <a:pPr/>
-              <a:t>‹#›</a:t>
+              <a:t>‹N°›</a:t>
             </a:fld>
             <a:endParaRPr lang="fr-FR">
               <a:solidFill>
@@ -5037,7 +5037,7 @@
                 <a:latin typeface="Trebuchet MS"/>
               </a:rPr>
               <a:pPr/>
-              <a:t>‹#›</a:t>
+              <a:t>‹N°›</a:t>
             </a:fld>
             <a:endParaRPr lang="fr-FR">
               <a:solidFill>
@@ -5193,7 +5193,7 @@
                 <a:latin typeface="Trebuchet MS"/>
               </a:rPr>
               <a:pPr/>
-              <a:t>‹#›</a:t>
+              <a:t>‹N°›</a:t>
             </a:fld>
             <a:endParaRPr lang="fr-FR">
               <a:solidFill>
@@ -5321,7 +5321,7 @@
                 <a:latin typeface="Trebuchet MS"/>
               </a:rPr>
               <a:pPr/>
-              <a:t>‹#›</a:t>
+              <a:t>‹N°›</a:t>
             </a:fld>
             <a:endParaRPr lang="fr-FR">
               <a:solidFill>
@@ -5609,7 +5609,7 @@
                 <a:latin typeface="Trebuchet MS"/>
               </a:rPr>
               <a:pPr/>
-              <a:t>‹#›</a:t>
+              <a:t>‹N°›</a:t>
             </a:fld>
             <a:endParaRPr lang="fr-FR">
               <a:solidFill>
@@ -5867,7 +5867,7 @@
                 <a:latin typeface="Trebuchet MS"/>
               </a:rPr>
               <a:pPr/>
-              <a:t>‹#›</a:t>
+              <a:t>‹N°›</a:t>
             </a:fld>
             <a:endParaRPr lang="fr-FR">
               <a:solidFill>
@@ -6189,7 +6189,7 @@
                 <a:latin typeface="Trebuchet MS"/>
               </a:rPr>
               <a:pPr/>
-              <a:t>‹#›</a:t>
+              <a:t>‹N°›</a:t>
             </a:fld>
             <a:endParaRPr lang="fr-FR">
               <a:solidFill>
@@ -6536,7 +6536,7 @@
                 <a:latin typeface="Trebuchet MS"/>
               </a:rPr>
               <a:pPr/>
-              <a:t>‹#›</a:t>
+              <a:t>‹N°›</a:t>
             </a:fld>
             <a:endParaRPr lang="fr-FR">
               <a:solidFill>
@@ -6898,7 +6898,7 @@
                 <a:latin typeface="Trebuchet MS"/>
               </a:rPr>
               <a:pPr/>
-              <a:t>‹#›</a:t>
+              <a:t>‹N°›</a:t>
             </a:fld>
             <a:endParaRPr lang="fr-FR">
               <a:solidFill>
@@ -7245,7 +7245,7 @@
                 <a:latin typeface="Trebuchet MS"/>
               </a:rPr>
               <a:pPr/>
-              <a:t>‹#›</a:t>
+              <a:t>‹N°›</a:t>
             </a:fld>
             <a:endParaRPr lang="fr-FR">
               <a:solidFill>
@@ -7575,7 +7575,7 @@
           <a:p>
             <a:fld id="{4FEE191A-8D90-4505-B0FF-FDEF0A3BF262}" type="slidenum">
               <a:rPr lang="fr-FR" smtClean="0"/>
-              <a:t>‹#›</a:t>
+              <a:t>‹N°›</a:t>
             </a:fld>
             <a:endParaRPr lang="fr-FR"/>
           </a:p>
@@ -7914,7 +7914,7 @@
                 <a:latin typeface="Trebuchet MS"/>
               </a:rPr>
               <a:pPr/>
-              <a:t>‹#›</a:t>
+              <a:t>‹N°›</a:t>
             </a:fld>
             <a:endParaRPr lang="fr-FR">
               <a:solidFill>
@@ -8117,7 +8117,7 @@
                 <a:latin typeface="Trebuchet MS"/>
               </a:rPr>
               <a:pPr/>
-              <a:t>‹#›</a:t>
+              <a:t>‹N°›</a:t>
             </a:fld>
             <a:endParaRPr lang="fr-FR">
               <a:solidFill>
@@ -8330,7 +8330,7 @@
                 <a:latin typeface="Trebuchet MS"/>
               </a:rPr>
               <a:pPr/>
-              <a:t>‹#›</a:t>
+              <a:t>‹N°›</a:t>
             </a:fld>
             <a:endParaRPr lang="fr-FR">
               <a:solidFill>
@@ -9169,7 +9169,7 @@
                 <a:latin typeface="Trebuchet MS"/>
               </a:rPr>
               <a:pPr/>
-              <a:t>‹#›</a:t>
+              <a:t>‹N°›</a:t>
             </a:fld>
             <a:endParaRPr lang="fr-FR">
               <a:solidFill>
@@ -9372,7 +9372,7 @@
                 <a:latin typeface="Trebuchet MS"/>
               </a:rPr>
               <a:pPr/>
-              <a:t>‹#›</a:t>
+              <a:t>‹N°›</a:t>
             </a:fld>
             <a:endParaRPr lang="fr-FR">
               <a:solidFill>
@@ -9652,7 +9652,7 @@
                 <a:latin typeface="Trebuchet MS"/>
               </a:rPr>
               <a:pPr/>
-              <a:t>‹#›</a:t>
+              <a:t>‹N°›</a:t>
             </a:fld>
             <a:endParaRPr lang="fr-FR">
               <a:solidFill>
@@ -9917,7 +9917,7 @@
                 <a:latin typeface="Trebuchet MS"/>
               </a:rPr>
               <a:pPr/>
-              <a:t>‹#›</a:t>
+              <a:t>‹N°›</a:t>
             </a:fld>
             <a:endParaRPr lang="fr-FR">
               <a:solidFill>
@@ -10324,7 +10324,7 @@
                 <a:latin typeface="Trebuchet MS"/>
               </a:rPr>
               <a:pPr/>
-              <a:t>‹#›</a:t>
+              <a:t>‹N°›</a:t>
             </a:fld>
             <a:endParaRPr lang="fr-FR">
               <a:solidFill>
@@ -10480,7 +10480,7 @@
                 <a:latin typeface="Trebuchet MS"/>
               </a:rPr>
               <a:pPr/>
-              <a:t>‹#›</a:t>
+              <a:t>‹N°›</a:t>
             </a:fld>
             <a:endParaRPr lang="fr-FR">
               <a:solidFill>
@@ -10608,7 +10608,7 @@
                 <a:latin typeface="Trebuchet MS"/>
               </a:rPr>
               <a:pPr/>
-              <a:t>‹#›</a:t>
+              <a:t>‹N°›</a:t>
             </a:fld>
             <a:endParaRPr lang="fr-FR">
               <a:solidFill>
@@ -10845,7 +10845,7 @@
           <a:p>
             <a:fld id="{4FEE191A-8D90-4505-B0FF-FDEF0A3BF262}" type="slidenum">
               <a:rPr lang="fr-FR" smtClean="0"/>
-              <a:t>‹#›</a:t>
+              <a:t>‹N°›</a:t>
             </a:fld>
             <a:endParaRPr lang="fr-FR"/>
           </a:p>
@@ -11128,7 +11128,7 @@
                 <a:latin typeface="Trebuchet MS"/>
               </a:rPr>
               <a:pPr/>
-              <a:t>‹#›</a:t>
+              <a:t>‹N°›</a:t>
             </a:fld>
             <a:endParaRPr lang="fr-FR">
               <a:solidFill>
@@ -11386,7 +11386,7 @@
                 <a:latin typeface="Trebuchet MS"/>
               </a:rPr>
               <a:pPr/>
-              <a:t>‹#›</a:t>
+              <a:t>‹N°›</a:t>
             </a:fld>
             <a:endParaRPr lang="fr-FR">
               <a:solidFill>
@@ -11708,7 +11708,7 @@
                 <a:latin typeface="Trebuchet MS"/>
               </a:rPr>
               <a:pPr/>
-              <a:t>‹#›</a:t>
+              <a:t>‹N°›</a:t>
             </a:fld>
             <a:endParaRPr lang="fr-FR">
               <a:solidFill>
@@ -12055,7 +12055,7 @@
                 <a:latin typeface="Trebuchet MS"/>
               </a:rPr>
               <a:pPr/>
-              <a:t>‹#›</a:t>
+              <a:t>‹N°›</a:t>
             </a:fld>
             <a:endParaRPr lang="fr-FR">
               <a:solidFill>
@@ -12417,7 +12417,7 @@
                 <a:latin typeface="Trebuchet MS"/>
               </a:rPr>
               <a:pPr/>
-              <a:t>‹#›</a:t>
+              <a:t>‹N°›</a:t>
             </a:fld>
             <a:endParaRPr lang="fr-FR">
               <a:solidFill>
@@ -12764,7 +12764,7 @@
                 <a:latin typeface="Trebuchet MS"/>
               </a:rPr>
               <a:pPr/>
-              <a:t>‹#›</a:t>
+              <a:t>‹N°›</a:t>
             </a:fld>
             <a:endParaRPr lang="fr-FR">
               <a:solidFill>
@@ -13186,7 +13186,7 @@
                 <a:latin typeface="Trebuchet MS"/>
               </a:rPr>
               <a:pPr/>
-              <a:t>‹#›</a:t>
+              <a:t>‹N°›</a:t>
             </a:fld>
             <a:endParaRPr lang="fr-FR">
               <a:solidFill>
@@ -13389,7 +13389,7 @@
                 <a:latin typeface="Trebuchet MS"/>
               </a:rPr>
               <a:pPr/>
-              <a:t>‹#›</a:t>
+              <a:t>‹N°›</a:t>
             </a:fld>
             <a:endParaRPr lang="fr-FR">
               <a:solidFill>
@@ -13602,7 +13602,7 @@
                 <a:latin typeface="Trebuchet MS"/>
               </a:rPr>
               <a:pPr/>
-              <a:t>‹#›</a:t>
+              <a:t>‹N°›</a:t>
             </a:fld>
             <a:endParaRPr lang="fr-FR">
               <a:solidFill>
@@ -13981,7 +13981,7 @@
           <a:p>
             <a:fld id="{4FEE191A-8D90-4505-B0FF-FDEF0A3BF262}" type="slidenum">
               <a:rPr lang="fr-FR" smtClean="0"/>
-              <a:t>‹#›</a:t>
+              <a:t>‹N°›</a:t>
             </a:fld>
             <a:endParaRPr lang="fr-FR"/>
           </a:p>
@@ -14104,7 +14104,7 @@
           <a:p>
             <a:fld id="{4FEE191A-8D90-4505-B0FF-FDEF0A3BF262}" type="slidenum">
               <a:rPr lang="fr-FR" smtClean="0"/>
-              <a:t>‹#›</a:t>
+              <a:t>‹N°›</a:t>
             </a:fld>
             <a:endParaRPr lang="fr-FR"/>
           </a:p>
@@ -14199,7 +14199,7 @@
           <a:p>
             <a:fld id="{4FEE191A-8D90-4505-B0FF-FDEF0A3BF262}" type="slidenum">
               <a:rPr lang="fr-FR" smtClean="0"/>
-              <a:t>‹#›</a:t>
+              <a:t>‹N°›</a:t>
             </a:fld>
             <a:endParaRPr lang="fr-FR"/>
           </a:p>
@@ -14454,7 +14454,7 @@
           <a:p>
             <a:fld id="{4FEE191A-8D90-4505-B0FF-FDEF0A3BF262}" type="slidenum">
               <a:rPr lang="fr-FR" smtClean="0"/>
-              <a:t>‹#›</a:t>
+              <a:t>‹N°›</a:t>
             </a:fld>
             <a:endParaRPr lang="fr-FR"/>
           </a:p>
@@ -14694,7 +14694,7 @@
           <a:p>
             <a:fld id="{4FEE191A-8D90-4505-B0FF-FDEF0A3BF262}" type="slidenum">
               <a:rPr lang="fr-FR" smtClean="0"/>
-              <a:t>‹#›</a:t>
+              <a:t>‹N°›</a:t>
             </a:fld>
             <a:endParaRPr lang="fr-FR"/>
           </a:p>
@@ -15495,7 +15495,7 @@
           <a:p>
             <a:fld id="{4FEE191A-8D90-4505-B0FF-FDEF0A3BF262}" type="slidenum">
               <a:rPr lang="fr-FR" smtClean="0"/>
-              <a:t>‹#›</a:t>
+              <a:t>‹N°›</a:t>
             </a:fld>
             <a:endParaRPr lang="fr-FR"/>
           </a:p>
@@ -16713,7 +16713,7 @@
                 <a:latin typeface="Trebuchet MS"/>
               </a:rPr>
               <a:pPr/>
-              <a:t>‹#›</a:t>
+              <a:t>‹N°›</a:t>
             </a:fld>
             <a:endParaRPr lang="fr-FR">
               <a:solidFill>
@@ -17936,7 +17936,7 @@
                 <a:latin typeface="Trebuchet MS"/>
               </a:rPr>
               <a:pPr/>
-              <a:t>‹#›</a:t>
+              <a:t>‹N°›</a:t>
             </a:fld>
             <a:endParaRPr lang="fr-FR">
               <a:solidFill>
@@ -18814,7 +18814,7 @@
         </p:spPr>
         <p:txBody>
           <a:bodyPr vert="horz" lIns="91440" tIns="45720" rIns="91440" bIns="45720" rtlCol="0" anchor="t">
-            <a:normAutofit/>
+            <a:normAutofit lnSpcReduction="10000"/>
           </a:bodyPr>
           <a:lstStyle>
             <a:lvl1pPr algn="l" defTabSz="457200" rtl="0" eaLnBrk="1" latinLnBrk="0" hangingPunct="1">
@@ -18914,6 +18914,94 @@
             </a:endParaRPr>
           </a:p>
           <a:p>
+            <a:pPr lvl="1">
+              <a:buFont typeface="Arial"/>
+              <a:buChar char="•"/>
+            </a:pPr>
+            <a:r>
+              <a:rPr lang="fr-FR" sz="1600" dirty="0">
+                <a:solidFill>
+                  <a:srgbClr val="000000"/>
+                </a:solidFill>
+              </a:rPr>
+              <a:t> 1</a:t>
+            </a:r>
+            <a:r>
+              <a:rPr lang="fr-FR" sz="1600" baseline="30000" dirty="0">
+                <a:solidFill>
+                  <a:srgbClr val="000000"/>
+                </a:solidFill>
+              </a:rPr>
+              <a:t>e</a:t>
+            </a:r>
+            <a:r>
+              <a:rPr lang="fr-FR" sz="1600" dirty="0">
+                <a:solidFill>
+                  <a:srgbClr val="000000"/>
+                </a:solidFill>
+              </a:rPr>
+              <a:t> semaine intégralement sur un unique projet =&gt; très intéressant !</a:t>
+            </a:r>
+          </a:p>
+          <a:p>
+            <a:pPr lvl="1">
+              <a:buFont typeface="Arial"/>
+              <a:buChar char="•"/>
+            </a:pPr>
+            <a:endParaRPr lang="fr-FR" sz="1600" dirty="0">
+              <a:solidFill>
+                <a:srgbClr val="000000"/>
+              </a:solidFill>
+            </a:endParaRPr>
+          </a:p>
+          <a:p>
+            <a:pPr lvl="1">
+              <a:buFont typeface="Arial"/>
+              <a:buChar char="•"/>
+            </a:pPr>
+            <a:r>
+              <a:rPr lang="fr-FR" sz="1600" dirty="0">
+                <a:solidFill>
+                  <a:srgbClr val="000000"/>
+                </a:solidFill>
+              </a:rPr>
+              <a:t>  Cohésion parfaite entre les membres de l’équipe (niveau humain et professionnel)</a:t>
+            </a:r>
+          </a:p>
+          <a:p>
+            <a:pPr lvl="1">
+              <a:buFont typeface="Arial"/>
+              <a:buChar char="•"/>
+            </a:pPr>
+            <a:endParaRPr lang="fr-FR" sz="1600" dirty="0">
+              <a:solidFill>
+                <a:srgbClr val="000000"/>
+              </a:solidFill>
+            </a:endParaRPr>
+          </a:p>
+          <a:p>
+            <a:pPr lvl="1">
+              <a:buFont typeface="Arial"/>
+              <a:buChar char="•"/>
+            </a:pPr>
+            <a:r>
+              <a:rPr lang="fr-FR" sz="1600" dirty="0">
+                <a:solidFill>
+                  <a:srgbClr val="000000"/>
+                </a:solidFill>
+              </a:rPr>
+              <a:t>  Approfondissement de mes connaissances en web et de la préparation du projet (avant de commencer à coder)</a:t>
+            </a:r>
+          </a:p>
+          <a:p>
+            <a:pPr lvl="1"/>
+            <a:endParaRPr lang="fr-FR" sz="2000" dirty="0">
+              <a:solidFill>
+                <a:srgbClr val="000000"/>
+              </a:solidFill>
+            </a:endParaRPr>
+          </a:p>
+          <a:p>
             <a:pPr marL="457200" indent="-457200">
               <a:buFont typeface="Wingdings" charset="2"/>
               <a:buChar char="Ø"/>
@@ -18925,54 +19013,6 @@
             </a:endParaRPr>
           </a:p>
           <a:p>
-            <a:pPr marL="457200" indent="-457200">
-              <a:buFont typeface="Wingdings" charset="2"/>
-              <a:buChar char="Ø"/>
-            </a:pPr>
-            <a:endParaRPr lang="fr-FR" sz="2000" dirty="0">
-              <a:solidFill>
-                <a:schemeClr val="tx1"/>
-              </a:solidFill>
-            </a:endParaRPr>
-          </a:p>
-          <a:p>
-            <a:pPr marL="457200" indent="-457200">
-              <a:buFont typeface="Wingdings" charset="2"/>
-              <a:buChar char="Ø"/>
-            </a:pPr>
-            <a:endParaRPr lang="fr-FR" sz="2000" dirty="0">
-              <a:solidFill>
-                <a:schemeClr val="tx1"/>
-              </a:solidFill>
-            </a:endParaRPr>
-          </a:p>
-          <a:p>
-            <a:pPr marL="457200" indent="-457200">
-              <a:buFont typeface="Wingdings" charset="2"/>
-              <a:buChar char="Ø"/>
-            </a:pPr>
-            <a:endParaRPr lang="fr-FR" sz="2000" dirty="0">
-              <a:solidFill>
-                <a:schemeClr val="tx1"/>
-              </a:solidFill>
-            </a:endParaRPr>
-          </a:p>
-          <a:p>
-            <a:pPr marL="457200" indent="-457200">
-              <a:buFont typeface="Wingdings" charset="2"/>
-              <a:buChar char="Ø"/>
-            </a:pPr>
-            <a:endParaRPr lang="fr-FR" sz="2000" dirty="0">
-              <a:solidFill>
-                <a:schemeClr val="tx1"/>
-              </a:solidFill>
-            </a:endParaRPr>
-          </a:p>
-          <a:p>
-            <a:pPr marL="457200" indent="-457200">
-              <a:buFont typeface="Wingdings" charset="2"/>
-              <a:buChar char="Ø"/>
-            </a:pPr>
             <a:endParaRPr lang="fr-FR" sz="2000" dirty="0">
               <a:solidFill>
                 <a:schemeClr val="tx1"/>
@@ -19693,23 +19733,7 @@
                   <a:srgbClr val="000000"/>
                 </a:solidFill>
               </a:rPr>
-              <a:t>Template </a:t>
-            </a:r>
-            <a:r>
-              <a:rPr lang="fr-FR" sz="2000" dirty="0" err="1">
-                <a:solidFill>
-                  <a:srgbClr val="000000"/>
-                </a:solidFill>
-              </a:rPr>
-              <a:t>Bootstrap</a:t>
-            </a:r>
-            <a:r>
-              <a:rPr lang="fr-FR" sz="2000" dirty="0">
-                <a:solidFill>
-                  <a:srgbClr val="000000"/>
-                </a:solidFill>
-              </a:rPr>
-              <a:t> « </a:t>
+              <a:t>Template Bootstrap « </a:t>
             </a:r>
             <a:r>
               <a:rPr lang="fr-FR" sz="2000" dirty="0" err="1">
@@ -19752,12 +19776,149 @@
               </a:rPr>
               <a:t>html5up.net</a:t>
             </a:r>
+          </a:p>
+          <a:p>
+            <a:endParaRPr lang="fr-FR" sz="2000" dirty="0">
+              <a:solidFill>
+                <a:srgbClr val="000000"/>
+              </a:solidFill>
+            </a:endParaRPr>
           </a:p>
           <a:p>
             <a:pPr marL="457200" indent="-457200">
               <a:buFont typeface="Wingdings" charset="2"/>
               <a:buChar char="Ø"/>
             </a:pPr>
+            <a:r>
+              <a:rPr lang="fr-FR" sz="2000" dirty="0">
+                <a:solidFill>
+                  <a:srgbClr val="000000"/>
+                </a:solidFill>
+              </a:rPr>
+              <a:t>Login </a:t>
+            </a:r>
+            <a:r>
+              <a:rPr lang="fr-FR" sz="2000" dirty="0" err="1">
+                <a:solidFill>
+                  <a:srgbClr val="000000"/>
+                </a:solidFill>
+              </a:rPr>
+              <a:t>Verification</a:t>
+            </a:r>
+            <a:r>
+              <a:rPr lang="fr-FR" sz="2000" dirty="0">
+                <a:solidFill>
+                  <a:srgbClr val="000000"/>
+                </a:solidFill>
+              </a:rPr>
+              <a:t> by Session</a:t>
+            </a:r>
+            <a:br>
+              <a:rPr lang="fr-FR" sz="2000" dirty="0">
+                <a:solidFill>
+                  <a:srgbClr val="000000"/>
+                </a:solidFill>
+                <a:sym typeface="Wingdings"/>
+              </a:rPr>
+            </a:br>
+            <a:r>
+              <a:rPr lang="fr-FR" sz="2000" dirty="0">
+                <a:solidFill>
+                  <a:srgbClr val="000000"/>
+                </a:solidFill>
+                <a:sym typeface="Wingdings"/>
+              </a:rPr>
+              <a:t>Lien : </a:t>
+            </a:r>
+            <a:r>
+              <a:rPr lang="fr-FR" sz="2000" dirty="0">
+                <a:solidFill>
+                  <a:srgbClr val="000000"/>
+                </a:solidFill>
+              </a:rPr>
+              <a:t>sitepoint.com/users-php-sessions-mysql/</a:t>
+            </a:r>
+          </a:p>
+          <a:p>
+            <a:pPr marL="457200" indent="-457200">
+              <a:buFont typeface="Wingdings" charset="2"/>
+              <a:buChar char="Ø"/>
+            </a:pPr>
+            <a:endParaRPr lang="fr-FR" sz="2000" dirty="0">
+              <a:solidFill>
+                <a:srgbClr val="000000"/>
+              </a:solidFill>
+            </a:endParaRPr>
+          </a:p>
+          <a:p>
+            <a:pPr marL="457200" indent="-457200">
+              <a:buFont typeface="Wingdings" charset="2"/>
+              <a:buChar char="Ø"/>
+            </a:pPr>
+            <a:r>
+              <a:rPr lang="fr-FR" sz="2000" dirty="0">
+                <a:solidFill>
+                  <a:srgbClr val="000000"/>
+                </a:solidFill>
+                <a:sym typeface="Wingdings"/>
+              </a:rPr>
+              <a:t>Recherches quelconques</a:t>
+            </a:r>
+            <a:br>
+              <a:rPr lang="fr-FR" sz="2000" dirty="0">
+                <a:solidFill>
+                  <a:srgbClr val="000000"/>
+                </a:solidFill>
+                <a:sym typeface="Wingdings"/>
+              </a:rPr>
+            </a:br>
+            <a:r>
+              <a:rPr lang="fr-FR" sz="2000" dirty="0">
+                <a:solidFill>
+                  <a:srgbClr val="000000"/>
+                </a:solidFill>
+                <a:sym typeface="Wingdings"/>
+              </a:rPr>
+              <a:t>Liens : </a:t>
+            </a:r>
+            <a:r>
+              <a:rPr lang="fr-FR" sz="2000" dirty="0">
+                <a:solidFill>
+                  <a:srgbClr val="000000"/>
+                </a:solidFill>
+              </a:rPr>
+              <a:t>openclassroom.com</a:t>
+            </a:r>
+          </a:p>
+          <a:p>
+            <a:r>
+              <a:rPr lang="fr-FR" sz="2000" dirty="0">
+                <a:solidFill>
+                  <a:srgbClr val="000000"/>
+                </a:solidFill>
+              </a:rPr>
+              <a:t>		     stackoverflow.com</a:t>
+            </a:r>
+          </a:p>
+          <a:p>
+            <a:pPr marL="1371600" lvl="2" indent="-457200">
+              <a:buFont typeface="Wingdings" charset="2"/>
+              <a:buChar char="Ø"/>
+            </a:pPr>
+            <a:endParaRPr lang="fr-FR" sz="200" dirty="0">
+              <a:solidFill>
+                <a:srgbClr val="000000"/>
+              </a:solidFill>
+            </a:endParaRPr>
+          </a:p>
+          <a:p>
+            <a:endParaRPr lang="fr-FR" sz="2000" dirty="0">
+              <a:solidFill>
+                <a:srgbClr val="000000"/>
+              </a:solidFill>
+            </a:endParaRPr>
+          </a:p>
+          <a:p>
             <a:endParaRPr lang="fr-FR" sz="2000" dirty="0">
               <a:solidFill>
                 <a:srgbClr val="000000"/>
@@ -21749,7 +21910,7 @@
           </a:ln>
           <a:extLst>
             <a:ext uri="{53640926-AAD7-44d8-BBD7-CCE9431645EC}">
-              <a14:shadowObscured xmlns:a14="http://schemas.microsoft.com/office/drawing/2010/main" xmlns=""/>
+              <a14:shadowObscured xmlns="" xmlns:a14="http://schemas.microsoft.com/office/drawing/2010/main"/>
             </a:ext>
           </a:extLst>
         </p:spPr>
@@ -21784,10 +21945,10 @@
           </a:ln>
           <a:extLst>
             <a:ext uri="{53640926-AAD7-44d8-BBD7-CCE9431645EC}">
-              <a14:shadowObscured xmlns:a14="http://schemas.microsoft.com/office/drawing/2010/main" xmlns=""/>
+              <a14:shadowObscured xmlns="" xmlns:a14="http://schemas.microsoft.com/office/drawing/2010/main"/>
             </a:ext>
             <a:ext uri="{FAA26D3D-D897-4be2-8F04-BA451C77F1D7}">
-              <ma14:placeholderFlag xmlns:ma14="http://schemas.microsoft.com/office/mac/drawingml/2011/main" xmlns=""/>
+              <ma14:placeholderFlag xmlns="" xmlns:ma14="http://schemas.microsoft.com/office/mac/drawingml/2011/main"/>
             </a:ext>
           </a:extLst>
         </p:spPr>
@@ -21916,7 +22077,7 @@
           </a:prstGeom>
           <a:extLst>
             <a:ext uri="{FAA26D3D-D897-4be2-8F04-BA451C77F1D7}">
-              <ma14:placeholderFlag xmlns:ma14="http://schemas.microsoft.com/office/mac/drawingml/2011/main" xmlns=""/>
+              <ma14:placeholderFlag xmlns="" xmlns:ma14="http://schemas.microsoft.com/office/mac/drawingml/2011/main"/>
             </a:ext>
           </a:extLst>
         </p:spPr>
@@ -21949,7 +22110,7 @@
           </a:prstGeom>
           <a:extLst>
             <a:ext uri="{FAA26D3D-D897-4be2-8F04-BA451C77F1D7}">
-              <ma14:placeholderFlag xmlns:ma14="http://schemas.microsoft.com/office/mac/drawingml/2011/main" xmlns=""/>
+              <ma14:placeholderFlag xmlns="" xmlns:ma14="http://schemas.microsoft.com/office/mac/drawingml/2011/main"/>
             </a:ext>
           </a:extLst>
         </p:spPr>
@@ -22142,7 +22303,7 @@
           </a:prstGeom>
           <a:extLst>
             <a:ext uri="{FAA26D3D-D897-4be2-8F04-BA451C77F1D7}">
-              <ma14:placeholderFlag xmlns:ma14="http://schemas.microsoft.com/office/mac/drawingml/2011/main" xmlns=""/>
+              <ma14:placeholderFlag xmlns="" xmlns:ma14="http://schemas.microsoft.com/office/mac/drawingml/2011/main"/>
             </a:ext>
           </a:extLst>
         </p:spPr>
@@ -22175,7 +22336,7 @@
           </a:prstGeom>
           <a:extLst>
             <a:ext uri="{FAA26D3D-D897-4be2-8F04-BA451C77F1D7}">
-              <ma14:placeholderFlag xmlns:ma14="http://schemas.microsoft.com/office/mac/drawingml/2011/main" xmlns=""/>
+              <ma14:placeholderFlag xmlns="" xmlns:ma14="http://schemas.microsoft.com/office/mac/drawingml/2011/main"/>
             </a:ext>
           </a:extLst>
         </p:spPr>
@@ -22424,6 +22585,223 @@
             </a:lvl9pPr>
           </a:lstStyle>
           <a:p>
+            <a:endParaRPr lang="fr-FR" sz="2800" dirty="0">
+              <a:solidFill>
+                <a:schemeClr val="tx1">
+                  <a:lumMod val="50000"/>
+                  <a:lumOff val="50000"/>
+                </a:schemeClr>
+              </a:solidFill>
+            </a:endParaRPr>
+          </a:p>
+        </p:txBody>
+      </p:sp>
+      <p:sp>
+        <p:nvSpPr>
+          <p:cNvPr id="4" name="Titre 1">
+            <a:extLst>
+              <a:ext uri="{FF2B5EF4-FFF2-40B4-BE49-F238E27FC236}">
+                <a16:creationId xmlns:a16="http://schemas.microsoft.com/office/drawing/2014/main" id="{E9D92546-67AB-4345-A2B0-4739AEA2EE73}"/>
+              </a:ext>
+            </a:extLst>
+          </p:cNvPr>
+          <p:cNvSpPr txBox="1">
+            <a:spLocks/>
+          </p:cNvSpPr>
+          <p:nvPr/>
+        </p:nvSpPr>
+        <p:spPr>
+          <a:xfrm>
+            <a:off x="896890" y="2200356"/>
+            <a:ext cx="7831100" cy="4758681"/>
+          </a:xfrm>
+          <a:prstGeom prst="rect">
+            <a:avLst/>
+          </a:prstGeom>
+        </p:spPr>
+        <p:txBody>
+          <a:bodyPr vert="horz" lIns="91440" tIns="45720" rIns="91440" bIns="45720" rtlCol="0" anchor="t">
+            <a:normAutofit/>
+          </a:bodyPr>
+          <a:lstStyle>
+            <a:lvl1pPr algn="l" defTabSz="457200" rtl="0" eaLnBrk="1" latinLnBrk="0" hangingPunct="1">
+              <a:spcBef>
+                <a:spcPct val="0"/>
+              </a:spcBef>
+              <a:buNone/>
+              <a:defRPr sz="3600" kern="1200">
+                <a:solidFill>
+                  <a:schemeClr val="accent1"/>
+                </a:solidFill>
+                <a:latin typeface="+mj-lt"/>
+                <a:ea typeface="+mj-ea"/>
+                <a:cs typeface="+mj-cs"/>
+              </a:defRPr>
+            </a:lvl1pPr>
+            <a:lvl2pPr eaLnBrk="1" hangingPunct="1">
+              <a:defRPr>
+                <a:solidFill>
+                  <a:schemeClr val="tx2"/>
+                </a:solidFill>
+              </a:defRPr>
+            </a:lvl2pPr>
+            <a:lvl3pPr eaLnBrk="1" hangingPunct="1">
+              <a:defRPr>
+                <a:solidFill>
+                  <a:schemeClr val="tx2"/>
+                </a:solidFill>
+              </a:defRPr>
+            </a:lvl3pPr>
+            <a:lvl4pPr eaLnBrk="1" hangingPunct="1">
+              <a:defRPr>
+                <a:solidFill>
+                  <a:schemeClr val="tx2"/>
+                </a:solidFill>
+              </a:defRPr>
+            </a:lvl4pPr>
+            <a:lvl5pPr eaLnBrk="1" hangingPunct="1">
+              <a:defRPr>
+                <a:solidFill>
+                  <a:schemeClr val="tx2"/>
+                </a:solidFill>
+              </a:defRPr>
+            </a:lvl5pPr>
+            <a:lvl6pPr eaLnBrk="1" hangingPunct="1">
+              <a:defRPr>
+                <a:solidFill>
+                  <a:schemeClr val="tx2"/>
+                </a:solidFill>
+              </a:defRPr>
+            </a:lvl6pPr>
+            <a:lvl7pPr eaLnBrk="1" hangingPunct="1">
+              <a:defRPr>
+                <a:solidFill>
+                  <a:schemeClr val="tx2"/>
+                </a:solidFill>
+              </a:defRPr>
+            </a:lvl7pPr>
+            <a:lvl8pPr eaLnBrk="1" hangingPunct="1">
+              <a:defRPr>
+                <a:solidFill>
+                  <a:schemeClr val="tx2"/>
+                </a:solidFill>
+              </a:defRPr>
+            </a:lvl8pPr>
+            <a:lvl9pPr eaLnBrk="1" hangingPunct="1">
+              <a:defRPr>
+                <a:solidFill>
+                  <a:schemeClr val="tx2"/>
+                </a:solidFill>
+              </a:defRPr>
+            </a:lvl9pPr>
+          </a:lstStyle>
+          <a:p>
+            <a:pPr marL="457200" indent="-457200">
+              <a:buFontTx/>
+              <a:buChar char="-"/>
+            </a:pPr>
+            <a:r>
+              <a:rPr lang="fr-FR" sz="2800" dirty="0">
+                <a:solidFill>
+                  <a:schemeClr val="tx1">
+                    <a:lumMod val="50000"/>
+                    <a:lumOff val="50000"/>
+                  </a:schemeClr>
+                </a:solidFill>
+              </a:rPr>
+              <a:t>Intégralité des pages en .</a:t>
+            </a:r>
+            <a:r>
+              <a:rPr lang="fr-FR" sz="2800" dirty="0" err="1">
+                <a:solidFill>
+                  <a:schemeClr val="tx1">
+                    <a:lumMod val="50000"/>
+                    <a:lumOff val="50000"/>
+                  </a:schemeClr>
+                </a:solidFill>
+              </a:rPr>
+              <a:t>php</a:t>
+            </a:r>
+            <a:r>
+              <a:rPr lang="fr-FR" sz="2800" dirty="0">
+                <a:solidFill>
+                  <a:schemeClr val="tx1">
+                    <a:lumMod val="50000"/>
+                    <a:lumOff val="50000"/>
+                  </a:schemeClr>
+                </a:solidFill>
+              </a:rPr>
+              <a:t> </a:t>
+            </a:r>
+          </a:p>
+          <a:p>
+            <a:pPr marL="457200" indent="-457200">
+              <a:buFontTx/>
+              <a:buChar char="-"/>
+            </a:pPr>
+            <a:endParaRPr lang="fr-FR" sz="2800" dirty="0">
+              <a:solidFill>
+                <a:schemeClr val="tx1">
+                  <a:lumMod val="50000"/>
+                  <a:lumOff val="50000"/>
+                </a:schemeClr>
+              </a:solidFill>
+            </a:endParaRPr>
+          </a:p>
+          <a:p>
+            <a:pPr marL="457200" indent="-457200">
+              <a:buFontTx/>
+              <a:buChar char="-"/>
+            </a:pPr>
+            <a:r>
+              <a:rPr lang="fr-FR" sz="2800" dirty="0">
+                <a:solidFill>
+                  <a:schemeClr val="tx1">
+                    <a:lumMod val="50000"/>
+                    <a:lumOff val="50000"/>
+                  </a:schemeClr>
+                </a:solidFill>
+              </a:rPr>
+              <a:t>Images/vidéos stockés sur le serveur non dans la base de données</a:t>
+            </a:r>
+          </a:p>
+          <a:p>
+            <a:pPr marL="457200" indent="-457200">
+              <a:buFontTx/>
+              <a:buChar char="-"/>
+            </a:pPr>
+            <a:endParaRPr lang="fr-FR" sz="2800" dirty="0">
+              <a:solidFill>
+                <a:schemeClr val="tx1">
+                  <a:lumMod val="50000"/>
+                  <a:lumOff val="50000"/>
+                </a:schemeClr>
+              </a:solidFill>
+            </a:endParaRPr>
+          </a:p>
+          <a:p>
+            <a:r>
+              <a:rPr lang="fr-FR" sz="2800" dirty="0">
+                <a:solidFill>
+                  <a:schemeClr val="tx1">
+                    <a:lumMod val="50000"/>
+                    <a:lumOff val="50000"/>
+                  </a:schemeClr>
+                </a:solidFill>
+              </a:rPr>
+              <a:t>-   Vérification du login de l’utilisateur à 	chaque page via un </a:t>
+            </a:r>
+            <a:r>
+              <a:rPr lang="fr-FR" sz="2800" dirty="0" err="1">
+                <a:solidFill>
+                  <a:schemeClr val="tx1">
+                    <a:lumMod val="50000"/>
+                    <a:lumOff val="50000"/>
+                  </a:schemeClr>
+                </a:solidFill>
+              </a:rPr>
+              <a:t>include</a:t>
+            </a:r>
             <a:endParaRPr lang="fr-FR" sz="2800" dirty="0">
               <a:solidFill>
                 <a:schemeClr val="tx1">

</xml_diff>

<commit_message>
Relecture + fin du Powerpoint
</commit_message>
<xml_diff>
--- a/Oral 05-05.pptx
+++ b/Oral 05-05.pptx
@@ -18401,7 +18401,7 @@
         </p:nvSpPr>
         <p:spPr>
           <a:xfrm>
-            <a:off x="1461265" y="2585690"/>
+            <a:off x="1506190" y="2585690"/>
             <a:ext cx="8640928" cy="916651"/>
           </a:xfrm>
         </p:spPr>
@@ -18695,6 +18695,10 @@
           </a:lstStyle>
           <a:p>
             <a:pPr algn="l"/>
+            <a:r>
+              <a:rPr lang="fr-FR" sz="2400" dirty="0"/>
+              <a:t/>
+            </a:r>
             <a:br>
               <a:rPr lang="fr-FR" sz="2400" dirty="0"/>
             </a:br>
@@ -18736,6 +18740,13 @@
   <p:clrMapOvr>
     <a:masterClrMapping/>
   </p:clrMapOvr>
+  <p:timing>
+    <p:tnLst>
+      <p:par>
+        <p:cTn id="1" dur="indefinite" restart="never" nodeType="tmRoot"/>
+      </p:par>
+    </p:tnLst>
+  </p:timing>
 </p:sld>
 </file>
 
@@ -18805,8 +18816,8 @@
         </p:nvSpPr>
         <p:spPr>
           <a:xfrm>
-            <a:off x="464327" y="1481666"/>
-            <a:ext cx="9409452" cy="4758681"/>
+            <a:off x="374175" y="1481666"/>
+            <a:ext cx="9491042" cy="4758681"/>
           </a:xfrm>
           <a:prstGeom prst="rect">
             <a:avLst/>
@@ -18924,15 +18935,31 @@
                   <a:srgbClr val="000000"/>
                 </a:solidFill>
               </a:rPr>
-              <a:t> 1</a:t>
-            </a:r>
-            <a:r>
-              <a:rPr lang="fr-FR" sz="1600" baseline="30000" dirty="0">
+              <a:t> </a:t>
+            </a:r>
+            <a:r>
+              <a:rPr lang="fr-FR" sz="1600" dirty="0" smtClean="0">
                 <a:solidFill>
                   <a:srgbClr val="000000"/>
                 </a:solidFill>
               </a:rPr>
-              <a:t>e</a:t>
+              <a:t>1</a:t>
+            </a:r>
+            <a:r>
+              <a:rPr lang="fr-FR" sz="1600" baseline="30000" dirty="0" smtClean="0">
+                <a:solidFill>
+                  <a:srgbClr val="000000"/>
+                </a:solidFill>
+              </a:rPr>
+              <a:t>ère</a:t>
+            </a:r>
+            <a:r>
+              <a:rPr lang="fr-FR" sz="1600" dirty="0" smtClean="0">
+                <a:solidFill>
+                  <a:srgbClr val="000000"/>
+                </a:solidFill>
+              </a:rPr>
+              <a:t> </a:t>
             </a:r>
             <a:r>
               <a:rPr lang="fr-FR" sz="1600" dirty="0">
@@ -18940,7 +18967,32 @@
                   <a:srgbClr val="000000"/>
                 </a:solidFill>
               </a:rPr>
-              <a:t> semaine intégralement sur un unique projet =&gt; très intéressant !</a:t>
+              <a:t>semaine intégralement sur un unique projet </a:t>
+            </a:r>
+            <a:r>
+              <a:rPr lang="fr-FR" sz="1600" dirty="0" smtClean="0">
+                <a:solidFill>
+                  <a:srgbClr val="000000"/>
+                </a:solidFill>
+                <a:sym typeface="Wingdings" panose="05000000000000000000" pitchFamily="2" charset="2"/>
+              </a:rPr>
+              <a:t></a:t>
+            </a:r>
+            <a:r>
+              <a:rPr lang="fr-FR" sz="1600" dirty="0" smtClean="0">
+                <a:solidFill>
+                  <a:srgbClr val="000000"/>
+                </a:solidFill>
+              </a:rPr>
+              <a:t> </a:t>
+            </a:r>
+            <a:r>
+              <a:rPr lang="fr-FR" sz="1600" dirty="0">
+                <a:solidFill>
+                  <a:srgbClr val="000000"/>
+                </a:solidFill>
+              </a:rPr>
+              <a:t>très intéressant </a:t>
             </a:r>
           </a:p>
           <a:p>
@@ -18995,7 +19047,7 @@
           </a:p>
           <a:p>
             <a:pPr lvl="1"/>
-            <a:endParaRPr lang="fr-FR" sz="2000" dirty="0">
+            <a:endParaRPr lang="fr-FR" sz="1600" dirty="0">
               <a:solidFill>
                 <a:srgbClr val="000000"/>
               </a:solidFill>
@@ -19069,8 +19121,21 @@
                   <a:srgbClr val="000000"/>
                 </a:solidFill>
               </a:rPr>
-              <a:t> Développement efficace de mes connaissances dans les langages web dans des conditions réelles.</a:t>
-            </a:r>
+              <a:t> Développement efficace de mes connaissances dans les langages web dans des conditions </a:t>
+            </a:r>
+            <a:r>
+              <a:rPr lang="fr-FR" sz="1600" dirty="0" smtClean="0">
+                <a:solidFill>
+                  <a:srgbClr val="000000"/>
+                </a:solidFill>
+              </a:rPr>
+              <a:t>réelles</a:t>
+            </a:r>
+            <a:endParaRPr lang="fr-FR" sz="1600" dirty="0">
+              <a:solidFill>
+                <a:srgbClr val="000000"/>
+              </a:solidFill>
+            </a:endParaRPr>
           </a:p>
           <a:p>
             <a:pPr lvl="1">
@@ -19094,7 +19159,15 @@
                   <a:srgbClr val="000000"/>
                 </a:solidFill>
               </a:rPr>
-              <a:t> Semaine très enrichissante car intensive avec une bonne cohésion d’équipe.</a:t>
+              <a:t> Semaine très enrichissante car intensive avec une bonne cohésion </a:t>
+            </a:r>
+            <a:r>
+              <a:rPr lang="fr-FR" sz="1600" dirty="0" smtClean="0">
+                <a:solidFill>
+                  <a:srgbClr val="000000"/>
+                </a:solidFill>
+              </a:rPr>
+              <a:t>d’équipe</a:t>
             </a:r>
             <a:endParaRPr lang="fr-FR" sz="2000" dirty="0">
               <a:solidFill>
@@ -19156,6 +19229,13 @@
   <p:clrMapOvr>
     <a:masterClrMapping/>
   </p:clrMapOvr>
+  <p:timing>
+    <p:tnLst>
+      <p:par>
+        <p:cTn id="1" dur="indefinite" restart="never" nodeType="tmRoot"/>
+      </p:par>
+    </p:tnLst>
+  </p:timing>
 </p:sld>
 </file>
 
@@ -19369,9 +19449,36 @@
                   <a:srgbClr val="000000"/>
                 </a:solidFill>
               </a:rPr>
-              <a:t> Fin de semaine de projet piscine difficile compte tenu de la fatigue mais très bonne expérience avec un bon esprit de groupe</a:t>
+              <a:t> Fin de semaine de projet piscine difficile compte tenu de la fatigue mais très bonne expérience avec un </a:t>
+            </a:r>
+            <a:r>
+              <a:rPr lang="fr-FR" sz="1600" dirty="0" smtClean="0">
+                <a:solidFill>
+                  <a:srgbClr val="000000"/>
+                </a:solidFill>
+              </a:rPr>
+              <a:t>très bon </a:t>
+            </a:r>
+            <a:r>
+              <a:rPr lang="fr-FR" sz="1600" dirty="0">
+                <a:solidFill>
+                  <a:srgbClr val="000000"/>
+                </a:solidFill>
+              </a:rPr>
+              <a:t>esprit de groupe</a:t>
             </a:r>
             <a:endParaRPr lang="fr-FR" sz="2000" dirty="0">
+              <a:solidFill>
+                <a:srgbClr val="000000"/>
+              </a:solidFill>
+            </a:endParaRPr>
+          </a:p>
+          <a:p>
+            <a:pPr marL="457200" indent="-457200">
+              <a:buFont typeface="Wingdings" charset="2"/>
+              <a:buChar char="Ø"/>
+            </a:pPr>
+            <a:endParaRPr lang="fr-FR" sz="2000" dirty="0" smtClean="0">
               <a:solidFill>
                 <a:srgbClr val="000000"/>
               </a:solidFill>
@@ -19412,6 +19519,14 @@
               </a:rPr>
               <a:t>Bilan collectif :</a:t>
             </a:r>
+            <a:r>
+              <a:rPr lang="fr-FR" sz="1600" dirty="0">
+                <a:solidFill>
+                  <a:srgbClr val="000000"/>
+                </a:solidFill>
+              </a:rPr>
+              <a:t/>
+            </a:r>
             <a:br>
               <a:rPr lang="fr-FR" sz="1600" dirty="0">
                 <a:solidFill>
@@ -19488,7 +19603,32 @@
                   <a:srgbClr val="000000"/>
                 </a:solidFill>
               </a:rPr>
-              <a:t> Contrainte de temps qui nous a conduit à faire des choix dans les fonctionnalités de notre site</a:t>
+              <a:t> Contrainte de temps </a:t>
+            </a:r>
+            <a:r>
+              <a:rPr lang="fr-FR" sz="1600" dirty="0" smtClean="0">
+                <a:solidFill>
+                  <a:srgbClr val="000000"/>
+                </a:solidFill>
+                <a:sym typeface="Wingdings" panose="05000000000000000000" pitchFamily="2" charset="2"/>
+              </a:rPr>
+              <a:t> </a:t>
+            </a:r>
+            <a:r>
+              <a:rPr lang="fr-FR" sz="1600" dirty="0" smtClean="0">
+                <a:solidFill>
+                  <a:srgbClr val="000000"/>
+                </a:solidFill>
+              </a:rPr>
+              <a:t>faire </a:t>
+            </a:r>
+            <a:r>
+              <a:rPr lang="fr-FR" sz="1600" dirty="0">
+                <a:solidFill>
+                  <a:srgbClr val="000000"/>
+                </a:solidFill>
+              </a:rPr>
+              <a:t>des choix dans les fonctionnalités de notre site</a:t>
             </a:r>
           </a:p>
           <a:p>
@@ -19570,6 +19710,13 @@
   <p:clrMapOvr>
     <a:masterClrMapping/>
   </p:clrMapOvr>
+  <p:timing>
+    <p:tnLst>
+      <p:par>
+        <p:cTn id="1" dur="indefinite" restart="never" nodeType="tmRoot"/>
+      </p:par>
+    </p:tnLst>
+  </p:timing>
 </p:sld>
 </file>
 
@@ -19639,7 +19786,7 @@
         </p:nvSpPr>
         <p:spPr>
           <a:xfrm>
-            <a:off x="628207" y="1645521"/>
+            <a:off x="653964" y="1774310"/>
             <a:ext cx="9218257" cy="4758681"/>
           </a:xfrm>
           <a:prstGeom prst="rect">
@@ -19751,6 +19898,15 @@
               </a:rPr>
               <a:t> by HTML 5 UP » </a:t>
             </a:r>
+            <a:r>
+              <a:rPr lang="fr-FR" sz="2000" dirty="0">
+                <a:solidFill>
+                  <a:srgbClr val="000000"/>
+                </a:solidFill>
+                <a:sym typeface="Wingdings"/>
+              </a:rPr>
+              <a:t/>
+            </a:r>
             <a:br>
               <a:rPr lang="fr-FR" sz="2000" dirty="0">
                 <a:solidFill>
@@ -19776,6 +19932,13 @@
               </a:rPr>
               <a:t>html5up.net</a:t>
             </a:r>
+          </a:p>
+          <a:p>
+            <a:endParaRPr lang="fr-FR" sz="2000" dirty="0" smtClean="0">
+              <a:solidFill>
+                <a:srgbClr val="000000"/>
+              </a:solidFill>
+            </a:endParaRPr>
           </a:p>
           <a:p>
             <a:endParaRPr lang="fr-FR" sz="2000" dirty="0">
@@ -19813,6 +19976,15 @@
               </a:rPr>
               <a:t> by Session</a:t>
             </a:r>
+            <a:r>
+              <a:rPr lang="fr-FR" sz="2000" dirty="0">
+                <a:solidFill>
+                  <a:srgbClr val="000000"/>
+                </a:solidFill>
+                <a:sym typeface="Wingdings"/>
+              </a:rPr>
+              <a:t/>
+            </a:r>
             <a:br>
               <a:rPr lang="fr-FR" sz="2000" dirty="0">
                 <a:solidFill>
@@ -19838,6 +20010,17 @@
               </a:rPr>
               <a:t>sitepoint.com/users-php-sessions-mysql/</a:t>
             </a:r>
+          </a:p>
+          <a:p>
+            <a:pPr marL="457200" indent="-457200">
+              <a:buFont typeface="Wingdings" charset="2"/>
+              <a:buChar char="Ø"/>
+            </a:pPr>
+            <a:endParaRPr lang="fr-FR" sz="2000" dirty="0" smtClean="0">
+              <a:solidFill>
+                <a:srgbClr val="000000"/>
+              </a:solidFill>
+            </a:endParaRPr>
           </a:p>
           <a:p>
             <a:pPr marL="457200" indent="-457200">
@@ -19965,6 +20148,13 @@
   <p:clrMapOvr>
     <a:masterClrMapping/>
   </p:clrMapOvr>
+  <p:timing>
+    <p:tnLst>
+      <p:par>
+        <p:cTn id="1" dur="indefinite" restart="never" nodeType="tmRoot"/>
+      </p:par>
+    </p:tnLst>
+  </p:timing>
 </p:sld>
 </file>
 
@@ -20113,11 +20303,8 @@
             </a:lvl9pPr>
           </a:lstStyle>
           <a:p>
-            <a:pPr marL="514350" indent="-514350">
-              <a:buAutoNum type="arabicParenR"/>
-            </a:pPr>
-            <a:r>
-              <a:rPr lang="fr-FR" sz="2800" dirty="0">
+            <a:r>
+              <a:rPr lang="fr-FR" sz="2800" dirty="0" smtClean="0">
                 <a:solidFill>
                   <a:schemeClr val="tx1">
                     <a:lumMod val="50000"/>
@@ -20125,7 +20312,18 @@
                   </a:schemeClr>
                 </a:solidFill>
               </a:rPr>
-              <a:t>Conception du back</a:t>
+              <a:t>1) Conception </a:t>
+            </a:r>
+            <a:r>
+              <a:rPr lang="fr-FR" sz="2800" dirty="0">
+                <a:solidFill>
+                  <a:schemeClr val="tx1">
+                    <a:lumMod val="50000"/>
+                    <a:lumOff val="50000"/>
+                  </a:schemeClr>
+                </a:solidFill>
+              </a:rPr>
+              <a:t>du back</a:t>
             </a:r>
           </a:p>
           <a:p>
@@ -20142,12 +20340,8 @@
             </a:endParaRPr>
           </a:p>
           <a:p>
-            <a:pPr marL="514350" indent="-514350">
-              <a:buFontTx/>
-              <a:buAutoNum type="arabicParenR"/>
-            </a:pPr>
-            <a:r>
-              <a:rPr lang="fr-FR" sz="2800" dirty="0">
+            <a:r>
+              <a:rPr lang="fr-FR" sz="2800" dirty="0" smtClean="0">
                 <a:solidFill>
                   <a:schemeClr val="tx1">
                     <a:lumMod val="50000"/>
@@ -20155,7 +20349,18 @@
                   </a:schemeClr>
                 </a:solidFill>
               </a:rPr>
-              <a:t>Design du front</a:t>
+              <a:t>2) Design </a:t>
+            </a:r>
+            <a:r>
+              <a:rPr lang="fr-FR" sz="2800" dirty="0">
+                <a:solidFill>
+                  <a:schemeClr val="tx1">
+                    <a:lumMod val="50000"/>
+                    <a:lumOff val="50000"/>
+                  </a:schemeClr>
+                </a:solidFill>
+              </a:rPr>
+              <a:t>du front</a:t>
             </a:r>
           </a:p>
           <a:p>
@@ -20169,11 +20374,8 @@
             </a:endParaRPr>
           </a:p>
           <a:p>
-            <a:pPr marL="514350" indent="-514350">
-              <a:buAutoNum type="arabicParenR"/>
-            </a:pPr>
-            <a:r>
-              <a:rPr lang="fr-FR" sz="2800" dirty="0">
+            <a:r>
+              <a:rPr lang="fr-FR" sz="2800" dirty="0" smtClean="0">
                 <a:solidFill>
                   <a:schemeClr val="tx1">
                     <a:lumMod val="50000"/>
@@ -20181,7 +20383,18 @@
                   </a:schemeClr>
                 </a:solidFill>
               </a:rPr>
-              <a:t>Spécifications fonctionnelles des pages web</a:t>
+              <a:t>3) Spécifications </a:t>
+            </a:r>
+            <a:r>
+              <a:rPr lang="fr-FR" sz="2800" dirty="0">
+                <a:solidFill>
+                  <a:schemeClr val="tx1">
+                    <a:lumMod val="50000"/>
+                    <a:lumOff val="50000"/>
+                  </a:schemeClr>
+                </a:solidFill>
+              </a:rPr>
+              <a:t>fonctionnelles des pages web</a:t>
             </a:r>
           </a:p>
           <a:p>
@@ -20198,11 +20411,8 @@
             </a:endParaRPr>
           </a:p>
           <a:p>
-            <a:pPr marL="514350" indent="-514350">
-              <a:buAutoNum type="arabicParenR"/>
-            </a:pPr>
-            <a:r>
-              <a:rPr lang="fr-FR" sz="2800" dirty="0">
+            <a:r>
+              <a:rPr lang="fr-FR" sz="2800" dirty="0" smtClean="0">
                 <a:solidFill>
                   <a:schemeClr val="tx1">
                     <a:lumMod val="50000"/>
@@ -20210,13 +20420,43 @@
                   </a:schemeClr>
                 </a:solidFill>
               </a:rPr>
-              <a:t>Versioning GIT</a:t>
-            </a:r>
-          </a:p>
-          <a:p>
-            <a:pPr marL="514350" indent="-514350">
-              <a:buAutoNum type="arabicParenR"/>
-            </a:pPr>
+              <a:t>4) </a:t>
+            </a:r>
+            <a:r>
+              <a:rPr lang="fr-FR" sz="2800" dirty="0" err="1" smtClean="0">
+                <a:solidFill>
+                  <a:schemeClr val="tx1">
+                    <a:lumMod val="50000"/>
+                    <a:lumOff val="50000"/>
+                  </a:schemeClr>
+                </a:solidFill>
+              </a:rPr>
+              <a:t>Versioning</a:t>
+            </a:r>
+            <a:r>
+              <a:rPr lang="fr-FR" sz="2800" dirty="0" smtClean="0">
+                <a:solidFill>
+                  <a:schemeClr val="tx1">
+                    <a:lumMod val="50000"/>
+                    <a:lumOff val="50000"/>
+                  </a:schemeClr>
+                </a:solidFill>
+              </a:rPr>
+              <a:t> </a:t>
+            </a:r>
+            <a:r>
+              <a:rPr lang="fr-FR" sz="2800" dirty="0">
+                <a:solidFill>
+                  <a:schemeClr val="tx1">
+                    <a:lumMod val="50000"/>
+                    <a:lumOff val="50000"/>
+                  </a:schemeClr>
+                </a:solidFill>
+              </a:rPr>
+              <a:t>GIT</a:t>
+            </a:r>
+          </a:p>
+          <a:p>
             <a:endParaRPr lang="fr-FR" sz="2800" dirty="0">
               <a:solidFill>
                 <a:schemeClr val="tx1">
@@ -20227,11 +20467,8 @@
             </a:endParaRPr>
           </a:p>
           <a:p>
-            <a:pPr marL="514350" indent="-514350">
-              <a:buAutoNum type="arabicParenR"/>
-            </a:pPr>
-            <a:r>
-              <a:rPr lang="fr-FR" sz="2800" dirty="0">
+            <a:r>
+              <a:rPr lang="fr-FR" sz="2800" dirty="0" smtClean="0">
                 <a:solidFill>
                   <a:schemeClr val="tx1">
                     <a:lumMod val="50000"/>
@@ -20239,13 +20476,21 @@
                   </a:schemeClr>
                 </a:solidFill>
               </a:rPr>
-              <a:t>Bilan individuel et collectif</a:t>
-            </a:r>
-          </a:p>
-          <a:p>
-            <a:pPr marL="514350" indent="-514350">
-              <a:buAutoNum type="arabicParenR"/>
-            </a:pPr>
+              <a:t>5) Bilan </a:t>
+            </a:r>
+            <a:r>
+              <a:rPr lang="fr-FR" sz="2800" dirty="0">
+                <a:solidFill>
+                  <a:schemeClr val="tx1">
+                    <a:lumMod val="50000"/>
+                    <a:lumOff val="50000"/>
+                  </a:schemeClr>
+                </a:solidFill>
+              </a:rPr>
+              <a:t>individuel et collectif</a:t>
+            </a:r>
+          </a:p>
+          <a:p>
             <a:endParaRPr lang="fr-FR" sz="2800" dirty="0">
               <a:solidFill>
                 <a:schemeClr val="tx1">
@@ -20256,11 +20501,8 @@
             </a:endParaRPr>
           </a:p>
           <a:p>
-            <a:pPr marL="514350" indent="-514350">
-              <a:buAutoNum type="arabicParenR"/>
-            </a:pPr>
-            <a:r>
-              <a:rPr lang="fr-FR" sz="2800" dirty="0">
+            <a:r>
+              <a:rPr lang="fr-FR" sz="2800" dirty="0" smtClean="0">
                 <a:solidFill>
                   <a:schemeClr val="tx1">
                     <a:lumMod val="50000"/>
@@ -20268,8 +20510,16 @@
                   </a:schemeClr>
                 </a:solidFill>
               </a:rPr>
-              <a:t>Sources</a:t>
-            </a:r>
+              <a:t>6) Sources</a:t>
+            </a:r>
+            <a:endParaRPr lang="fr-FR" sz="2800" dirty="0">
+              <a:solidFill>
+                <a:schemeClr val="tx1">
+                  <a:lumMod val="50000"/>
+                  <a:lumOff val="50000"/>
+                </a:schemeClr>
+              </a:solidFill>
+            </a:endParaRPr>
           </a:p>
         </p:txBody>
       </p:sp>
@@ -20283,6 +20533,13 @@
   <p:clrMapOvr>
     <a:masterClrMapping/>
   </p:clrMapOvr>
+  <p:timing>
+    <p:tnLst>
+      <p:par>
+        <p:cTn id="1" dur="indefinite" restart="never" nodeType="tmRoot"/>
+      </p:par>
+    </p:tnLst>
+  </p:timing>
 </p:sld>
 </file>
 
@@ -20712,6 +20969,13 @@
   <p:clrMapOvr>
     <a:masterClrMapping/>
   </p:clrMapOvr>
+  <p:timing>
+    <p:tnLst>
+      <p:par>
+        <p:cTn id="1" dur="indefinite" restart="never" nodeType="tmRoot"/>
+      </p:par>
+    </p:tnLst>
+  </p:timing>
 </p:sld>
 </file>
 
@@ -21828,6 +22092,13 @@
   <p:clrMapOvr>
     <a:masterClrMapping/>
   </p:clrMapOvr>
+  <p:timing>
+    <p:tnLst>
+      <p:par>
+        <p:cTn id="1" dur="indefinite" restart="never" nodeType="tmRoot"/>
+      </p:par>
+    </p:tnLst>
+  </p:timing>
 </p:sld>
 </file>
 
@@ -21910,7 +22181,7 @@
           </a:ln>
           <a:extLst>
             <a:ext uri="{53640926-AAD7-44d8-BBD7-CCE9431645EC}">
-              <a14:shadowObscured xmlns="" xmlns:a14="http://schemas.microsoft.com/office/drawing/2010/main"/>
+              <a14:shadowObscured xmlns:a14="http://schemas.microsoft.com/office/drawing/2010/main" xmlns=""/>
             </a:ext>
           </a:extLst>
         </p:spPr>
@@ -21945,10 +22216,10 @@
           </a:ln>
           <a:extLst>
             <a:ext uri="{53640926-AAD7-44d8-BBD7-CCE9431645EC}">
-              <a14:shadowObscured xmlns="" xmlns:a14="http://schemas.microsoft.com/office/drawing/2010/main"/>
+              <a14:shadowObscured xmlns:a14="http://schemas.microsoft.com/office/drawing/2010/main" xmlns=""/>
             </a:ext>
             <a:ext uri="{FAA26D3D-D897-4be2-8F04-BA451C77F1D7}">
-              <ma14:placeholderFlag xmlns="" xmlns:ma14="http://schemas.microsoft.com/office/mac/drawingml/2011/main"/>
+              <ma14:placeholderFlag xmlns:ma14="http://schemas.microsoft.com/office/mac/drawingml/2011/main" xmlns=""/>
             </a:ext>
           </a:extLst>
         </p:spPr>
@@ -22029,6 +22300,13 @@
   <p:clrMapOvr>
     <a:masterClrMapping/>
   </p:clrMapOvr>
+  <p:timing>
+    <p:tnLst>
+      <p:par>
+        <p:cTn id="1" dur="indefinite" restart="never" nodeType="tmRoot"/>
+      </p:par>
+    </p:tnLst>
+  </p:timing>
 </p:sld>
 </file>
 
@@ -22077,7 +22355,7 @@
           </a:prstGeom>
           <a:extLst>
             <a:ext uri="{FAA26D3D-D897-4be2-8F04-BA451C77F1D7}">
-              <ma14:placeholderFlag xmlns="" xmlns:ma14="http://schemas.microsoft.com/office/mac/drawingml/2011/main"/>
+              <ma14:placeholderFlag xmlns:ma14="http://schemas.microsoft.com/office/mac/drawingml/2011/main" xmlns=""/>
             </a:ext>
           </a:extLst>
         </p:spPr>
@@ -22110,7 +22388,7 @@
           </a:prstGeom>
           <a:extLst>
             <a:ext uri="{FAA26D3D-D897-4be2-8F04-BA451C77F1D7}">
-              <ma14:placeholderFlag xmlns="" xmlns:ma14="http://schemas.microsoft.com/office/mac/drawingml/2011/main"/>
+              <ma14:placeholderFlag xmlns:ma14="http://schemas.microsoft.com/office/mac/drawingml/2011/main" xmlns=""/>
             </a:ext>
           </a:extLst>
         </p:spPr>
@@ -22223,6 +22501,13 @@
   <p:clrMapOvr>
     <a:masterClrMapping/>
   </p:clrMapOvr>
+  <p:timing>
+    <p:tnLst>
+      <p:par>
+        <p:cTn id="1" dur="indefinite" restart="never" nodeType="tmRoot"/>
+      </p:par>
+    </p:tnLst>
+  </p:timing>
 </p:sld>
 </file>
 
@@ -22303,7 +22588,7 @@
           </a:prstGeom>
           <a:extLst>
             <a:ext uri="{FAA26D3D-D897-4be2-8F04-BA451C77F1D7}">
-              <ma14:placeholderFlag xmlns="" xmlns:ma14="http://schemas.microsoft.com/office/mac/drawingml/2011/main"/>
+              <ma14:placeholderFlag xmlns:ma14="http://schemas.microsoft.com/office/mac/drawingml/2011/main" xmlns=""/>
             </a:ext>
           </a:extLst>
         </p:spPr>
@@ -22336,7 +22621,7 @@
           </a:prstGeom>
           <a:extLst>
             <a:ext uri="{FAA26D3D-D897-4be2-8F04-BA451C77F1D7}">
-              <ma14:placeholderFlag xmlns="" xmlns:ma14="http://schemas.microsoft.com/office/mac/drawingml/2011/main"/>
+              <ma14:placeholderFlag xmlns:ma14="http://schemas.microsoft.com/office/mac/drawingml/2011/main" xmlns=""/>
             </a:ext>
           </a:extLst>
         </p:spPr>
@@ -22417,6 +22702,13 @@
   <p:clrMapOvr>
     <a:masterClrMapping/>
   </p:clrMapOvr>
+  <p:timing>
+    <p:tnLst>
+      <p:par>
+        <p:cTn id="1" dur="indefinite" restart="never" nodeType="tmRoot"/>
+      </p:par>
+    </p:tnLst>
+  </p:timing>
 </p:sld>
 </file>
 
@@ -22601,7 +22893,7 @@
           <p:cNvPr id="4" name="Titre 1">
             <a:extLst>
               <a:ext uri="{FF2B5EF4-FFF2-40B4-BE49-F238E27FC236}">
-                <a16:creationId xmlns:a16="http://schemas.microsoft.com/office/drawing/2014/main" id="{E9D92546-67AB-4345-A2B0-4739AEA2EE73}"/>
+                <a16:creationId xmlns:a16="http://schemas.microsoft.com/office/drawing/2014/main" xmlns="" id="{E9D92546-67AB-4345-A2B0-4739AEA2EE73}"/>
               </a:ext>
             </a:extLst>
           </p:cNvPr>
@@ -22612,8 +22904,8 @@
         </p:nvSpPr>
         <p:spPr>
           <a:xfrm>
-            <a:off x="896890" y="2200356"/>
-            <a:ext cx="7831100" cy="4758681"/>
+            <a:off x="639313" y="2099319"/>
+            <a:ext cx="9019842" cy="4758681"/>
           </a:xfrm>
           <a:prstGeom prst="rect">
             <a:avLst/>
@@ -22696,118 +22988,173 @@
             </a:lvl9pPr>
           </a:lstStyle>
           <a:p>
+            <a:pPr marL="342900" indent="-342900">
+              <a:buFont typeface="Wingdings" panose="05000000000000000000" pitchFamily="2" charset="2"/>
+              <a:buChar char="Ø"/>
+            </a:pPr>
+            <a:r>
+              <a:rPr lang="fr-FR" sz="2400" dirty="0" smtClean="0">
+                <a:solidFill>
+                  <a:schemeClr val="tx1"/>
+                </a:solidFill>
+              </a:rPr>
+              <a:t>Intégralité des pages en </a:t>
+            </a:r>
+            <a:r>
+              <a:rPr lang="fr-FR" sz="2400" dirty="0">
+                <a:solidFill>
+                  <a:schemeClr val="tx1"/>
+                </a:solidFill>
+              </a:rPr>
+              <a:t>.</a:t>
+            </a:r>
+            <a:r>
+              <a:rPr lang="fr-FR" sz="2400" dirty="0" err="1">
+                <a:solidFill>
+                  <a:schemeClr val="tx1"/>
+                </a:solidFill>
+              </a:rPr>
+              <a:t>php</a:t>
+            </a:r>
+            <a:r>
+              <a:rPr lang="fr-FR" sz="2400" dirty="0">
+                <a:solidFill>
+                  <a:schemeClr val="tx1"/>
+                </a:solidFill>
+              </a:rPr>
+              <a:t> </a:t>
+            </a:r>
+          </a:p>
+          <a:p>
             <a:pPr marL="457200" indent="-457200">
               <a:buFontTx/>
               <a:buChar char="-"/>
             </a:pPr>
-            <a:r>
-              <a:rPr lang="fr-FR" sz="2800" dirty="0">
-                <a:solidFill>
-                  <a:schemeClr val="tx1">
-                    <a:lumMod val="50000"/>
-                    <a:lumOff val="50000"/>
-                  </a:schemeClr>
-                </a:solidFill>
-              </a:rPr>
-              <a:t>Intégralité des pages en .</a:t>
-            </a:r>
-            <a:r>
-              <a:rPr lang="fr-FR" sz="2800" dirty="0" err="1">
-                <a:solidFill>
-                  <a:schemeClr val="tx1">
-                    <a:lumMod val="50000"/>
-                    <a:lumOff val="50000"/>
-                  </a:schemeClr>
-                </a:solidFill>
-              </a:rPr>
-              <a:t>php</a:t>
-            </a:r>
-            <a:r>
-              <a:rPr lang="fr-FR" sz="2800" dirty="0">
-                <a:solidFill>
-                  <a:schemeClr val="tx1">
-                    <a:lumMod val="50000"/>
-                    <a:lumOff val="50000"/>
-                  </a:schemeClr>
-                </a:solidFill>
-              </a:rPr>
-              <a:t> </a:t>
-            </a:r>
+            <a:endParaRPr lang="fr-FR" sz="2400" dirty="0" smtClean="0">
+              <a:solidFill>
+                <a:schemeClr val="tx1"/>
+              </a:solidFill>
+            </a:endParaRPr>
           </a:p>
           <a:p>
             <a:pPr marL="457200" indent="-457200">
               <a:buFontTx/>
               <a:buChar char="-"/>
             </a:pPr>
-            <a:endParaRPr lang="fr-FR" sz="2800" dirty="0">
+            <a:endParaRPr lang="fr-FR" sz="2400" dirty="0">
               <a:solidFill>
-                <a:schemeClr val="tx1">
-                  <a:lumMod val="50000"/>
-                  <a:lumOff val="50000"/>
-                </a:schemeClr>
+                <a:schemeClr val="tx1"/>
               </a:solidFill>
             </a:endParaRPr>
+          </a:p>
+          <a:p>
+            <a:pPr marL="342900" indent="-342900">
+              <a:buFont typeface="Wingdings" panose="05000000000000000000" pitchFamily="2" charset="2"/>
+              <a:buChar char="Ø"/>
+            </a:pPr>
+            <a:r>
+              <a:rPr lang="fr-FR" sz="2400" dirty="0" smtClean="0">
+                <a:solidFill>
+                  <a:schemeClr val="tx1"/>
+                </a:solidFill>
+              </a:rPr>
+              <a:t>Images et vidéos stockées </a:t>
+            </a:r>
+            <a:r>
+              <a:rPr lang="fr-FR" sz="2400" dirty="0">
+                <a:solidFill>
+                  <a:schemeClr val="tx1"/>
+                </a:solidFill>
+              </a:rPr>
+              <a:t>sur le </a:t>
+            </a:r>
+            <a:r>
+              <a:rPr lang="fr-FR" sz="2400" dirty="0" smtClean="0">
+                <a:solidFill>
+                  <a:schemeClr val="tx1"/>
+                </a:solidFill>
+              </a:rPr>
+              <a:t>serveur et </a:t>
+            </a:r>
+            <a:r>
+              <a:rPr lang="fr-FR" sz="2400" dirty="0">
+                <a:solidFill>
+                  <a:schemeClr val="tx1"/>
+                </a:solidFill>
+              </a:rPr>
+              <a:t>non dans la base de données</a:t>
+            </a:r>
           </a:p>
           <a:p>
             <a:pPr marL="457200" indent="-457200">
               <a:buFontTx/>
               <a:buChar char="-"/>
             </a:pPr>
-            <a:r>
-              <a:rPr lang="fr-FR" sz="2800" dirty="0">
-                <a:solidFill>
-                  <a:schemeClr val="tx1">
-                    <a:lumMod val="50000"/>
-                    <a:lumOff val="50000"/>
-                  </a:schemeClr>
-                </a:solidFill>
-              </a:rPr>
-              <a:t>Images/vidéos stockés sur le serveur non dans la base de données</a:t>
-            </a:r>
+            <a:endParaRPr lang="fr-FR" sz="2400" dirty="0" smtClean="0">
+              <a:solidFill>
+                <a:schemeClr val="tx1"/>
+              </a:solidFill>
+            </a:endParaRPr>
           </a:p>
           <a:p>
             <a:pPr marL="457200" indent="-457200">
               <a:buFontTx/>
               <a:buChar char="-"/>
             </a:pPr>
-            <a:endParaRPr lang="fr-FR" sz="2800" dirty="0">
+            <a:endParaRPr lang="fr-FR" sz="2400" dirty="0">
               <a:solidFill>
-                <a:schemeClr val="tx1">
-                  <a:lumMod val="50000"/>
-                  <a:lumOff val="50000"/>
-                </a:schemeClr>
+                <a:schemeClr val="tx1"/>
               </a:solidFill>
             </a:endParaRPr>
           </a:p>
           <a:p>
-            <a:r>
-              <a:rPr lang="fr-FR" sz="2800" dirty="0">
-                <a:solidFill>
-                  <a:schemeClr val="tx1">
-                    <a:lumMod val="50000"/>
-                    <a:lumOff val="50000"/>
-                  </a:schemeClr>
+            <a:pPr marL="342900" indent="-342900">
+              <a:buFont typeface="Wingdings" panose="05000000000000000000" pitchFamily="2" charset="2"/>
+              <a:buChar char="Ø"/>
+            </a:pPr>
+            <a:r>
+              <a:rPr lang="fr-FR" sz="2400" dirty="0" smtClean="0">
+                <a:solidFill>
+                  <a:schemeClr val="tx1"/>
                 </a:solidFill>
               </a:rPr>
-              <a:t>-   Vérification du login de l’utilisateur à 	chaque page via un </a:t>
-            </a:r>
-            <a:r>
-              <a:rPr lang="fr-FR" sz="2800" dirty="0" err="1">
-                <a:solidFill>
-                  <a:schemeClr val="tx1">
-                    <a:lumMod val="50000"/>
-                    <a:lumOff val="50000"/>
-                  </a:schemeClr>
+              <a:t>Vérification </a:t>
+            </a:r>
+            <a:r>
+              <a:rPr lang="fr-FR" sz="2400" dirty="0">
+                <a:solidFill>
+                  <a:schemeClr val="tx1"/>
+                </a:solidFill>
+              </a:rPr>
+              <a:t>du login de l’utilisateur à </a:t>
+            </a:r>
+            <a:r>
+              <a:rPr lang="fr-FR" sz="2400" dirty="0" smtClean="0">
+                <a:solidFill>
+                  <a:schemeClr val="tx1"/>
+                </a:solidFill>
+              </a:rPr>
+              <a:t>chaque </a:t>
+            </a:r>
+            <a:r>
+              <a:rPr lang="fr-FR" sz="2400" dirty="0">
+                <a:solidFill>
+                  <a:schemeClr val="tx1"/>
+                </a:solidFill>
+              </a:rPr>
+              <a:t>page via un </a:t>
+            </a:r>
+            <a:r>
+              <a:rPr lang="fr-FR" sz="2400" dirty="0" err="1">
+                <a:solidFill>
+                  <a:schemeClr val="tx1"/>
                 </a:solidFill>
               </a:rPr>
               <a:t>include</a:t>
             </a:r>
-            <a:endParaRPr lang="fr-FR" sz="2800" dirty="0">
+            <a:endParaRPr lang="fr-FR" sz="2400" dirty="0">
               <a:solidFill>
-                <a:schemeClr val="tx1">
-                  <a:lumMod val="50000"/>
-                  <a:lumOff val="50000"/>
-                </a:schemeClr>
+                <a:schemeClr val="tx1"/>
               </a:solidFill>
             </a:endParaRPr>
           </a:p>
@@ -22823,6 +23170,13 @@
   <p:clrMapOvr>
     <a:masterClrMapping/>
   </p:clrMapOvr>
+  <p:timing>
+    <p:tnLst>
+      <p:par>
+        <p:cTn id="1" dur="indefinite" restart="never" nodeType="tmRoot"/>
+      </p:par>
+    </p:tnLst>
+  </p:timing>
 </p:sld>
 </file>
 
@@ -22889,7 +23243,7 @@
         </p:nvSpPr>
         <p:spPr>
           <a:xfrm>
-            <a:off x="1925592" y="118037"/>
+            <a:off x="1892873" y="74315"/>
             <a:ext cx="8596484" cy="742200"/>
           </a:xfrm>
         </p:spPr>
@@ -22921,7 +23275,7 @@
         </p:nvSpPr>
         <p:spPr>
           <a:xfrm>
-            <a:off x="538499" y="6001996"/>
+            <a:off x="499862" y="6087639"/>
             <a:ext cx="9696092" cy="856004"/>
           </a:xfrm>
         </p:spPr>
@@ -22935,7 +23289,7 @@
               <a:buNone/>
             </a:pPr>
             <a:r>
-              <a:rPr lang="fr-FR" sz="1600" dirty="0">
+              <a:rPr lang="fr-FR" sz="1400" dirty="0">
                 <a:solidFill>
                   <a:schemeClr val="tx1">
                     <a:lumMod val="50000"/>
@@ -22946,7 +23300,7 @@
               <a:t>Lien du versioning GIT : </a:t>
             </a:r>
             <a:r>
-              <a:rPr lang="fr-FR" sz="1600" dirty="0" err="1">
+              <a:rPr lang="fr-FR" sz="1400" dirty="0" err="1">
                 <a:solidFill>
                   <a:schemeClr val="tx1">
                     <a:lumMod val="50000"/>
@@ -22957,7 +23311,7 @@
               <a:t>https</a:t>
             </a:r>
             <a:r>
-              <a:rPr lang="fr-FR" sz="1600" dirty="0">
+              <a:rPr lang="fr-FR" sz="1400" dirty="0">
                 <a:solidFill>
                   <a:schemeClr val="tx1">
                     <a:lumMod val="50000"/>
@@ -22968,7 +23322,7 @@
               <a:t>://</a:t>
             </a:r>
             <a:r>
-              <a:rPr lang="fr-FR" sz="1600" dirty="0" err="1">
+              <a:rPr lang="fr-FR" sz="1400" dirty="0" err="1">
                 <a:solidFill>
                   <a:schemeClr val="tx1">
                     <a:lumMod val="50000"/>
@@ -22979,7 +23333,7 @@
               <a:t>github.com</a:t>
             </a:r>
             <a:r>
-              <a:rPr lang="fr-FR" sz="1600" dirty="0">
+              <a:rPr lang="fr-FR" sz="1400" dirty="0">
                 <a:solidFill>
                   <a:schemeClr val="tx1">
                     <a:lumMod val="50000"/>
@@ -22990,7 +23344,7 @@
               <a:t>/</a:t>
             </a:r>
             <a:r>
-              <a:rPr lang="fr-FR" sz="1600" dirty="0" err="1">
+              <a:rPr lang="fr-FR" sz="1400" dirty="0" err="1">
                 <a:solidFill>
                   <a:schemeClr val="tx1">
                     <a:lumMod val="50000"/>
@@ -23001,7 +23355,7 @@
               <a:t>HugoFerreiraDosSantos</a:t>
             </a:r>
             <a:r>
-              <a:rPr lang="fr-FR" sz="1600" dirty="0">
+              <a:rPr lang="fr-FR" sz="1400" dirty="0">
                 <a:solidFill>
                   <a:schemeClr val="tx1">
                     <a:lumMod val="50000"/>
@@ -23012,7 +23366,7 @@
               <a:t>/Projet-Piscine</a:t>
             </a:r>
             <a:br>
-              <a:rPr lang="fr-FR" sz="1600" dirty="0">
+              <a:rPr lang="fr-FR" sz="1400" dirty="0">
                 <a:solidFill>
                   <a:schemeClr val="tx1">
                     <a:lumMod val="50000"/>
@@ -23022,7 +23376,7 @@
               </a:rPr>
             </a:br>
             <a:r>
-              <a:rPr lang="fr-FR" sz="1600" dirty="0">
+              <a:rPr lang="fr-FR" sz="1400" dirty="0">
                 <a:solidFill>
                   <a:schemeClr val="bg1">
                     <a:lumMod val="50000"/>
@@ -23032,7 +23386,7 @@
               <a:t>Login : </a:t>
             </a:r>
             <a:r>
-              <a:rPr lang="fr-FR" sz="1600" dirty="0" err="1">
+              <a:rPr lang="fr-FR" sz="1400" dirty="0" err="1">
                 <a:solidFill>
                   <a:schemeClr val="bg1">
                     <a:lumMod val="50000"/>
@@ -23042,7 +23396,7 @@
               <a:t>hugo.ferreira-dos-santos@edu.ece.fr</a:t>
             </a:r>
             <a:r>
-              <a:rPr lang="fr-FR" sz="1600" dirty="0">
+              <a:rPr lang="fr-FR" sz="1400" dirty="0">
                 <a:solidFill>
                   <a:schemeClr val="bg1">
                     <a:lumMod val="50000"/>
@@ -23052,7 +23406,7 @@
               <a:t> </a:t>
             </a:r>
             <a:br>
-              <a:rPr lang="fr-FR" sz="1600" dirty="0">
+              <a:rPr lang="fr-FR" sz="1400" dirty="0">
                 <a:solidFill>
                   <a:schemeClr val="bg1">
                     <a:lumMod val="50000"/>
@@ -23061,7 +23415,7 @@
               </a:rPr>
             </a:br>
             <a:r>
-              <a:rPr lang="fr-FR" sz="1600" dirty="0" err="1">
+              <a:rPr lang="fr-FR" sz="1400" dirty="0" err="1">
                 <a:solidFill>
                   <a:schemeClr val="bg1">
                     <a:lumMod val="50000"/>
@@ -23071,7 +23425,7 @@
               <a:t>Password</a:t>
             </a:r>
             <a:r>
-              <a:rPr lang="fr-FR" sz="1600" dirty="0">
+              <a:rPr lang="fr-FR" sz="1400" dirty="0">
                 <a:solidFill>
                   <a:schemeClr val="bg1">
                     <a:lumMod val="50000"/>
@@ -23104,8 +23458,8 @@
         </p:nvSpPr>
         <p:spPr>
           <a:xfrm>
-            <a:off x="3154692" y="955816"/>
-            <a:ext cx="6072847" cy="461665"/>
+            <a:off x="3764398" y="855562"/>
+            <a:ext cx="4769254" cy="461665"/>
           </a:xfrm>
           <a:prstGeom prst="rect">
             <a:avLst/>
@@ -23119,12 +23473,36 @@
           <a:lstStyle/>
           <a:p>
             <a:r>
+              <a:rPr lang="fr-FR" sz="2400" dirty="0" smtClean="0">
+                <a:solidFill>
+                  <a:srgbClr val="7F7F7F"/>
+                </a:solidFill>
+              </a:rPr>
+              <a:t>Extrait du </a:t>
+            </a:r>
+            <a:r>
+              <a:rPr lang="fr-FR" sz="2400" dirty="0" err="1" smtClean="0">
+                <a:solidFill>
+                  <a:srgbClr val="7F7F7F"/>
+                </a:solidFill>
+              </a:rPr>
+              <a:t>versioning</a:t>
+            </a:r>
+            <a:r>
+              <a:rPr lang="fr-FR" sz="2400" dirty="0" smtClean="0">
+                <a:solidFill>
+                  <a:srgbClr val="7F7F7F"/>
+                </a:solidFill>
+              </a:rPr>
+              <a:t> </a:t>
+            </a:r>
+            <a:r>
               <a:rPr lang="fr-FR" sz="2400" dirty="0">
                 <a:solidFill>
                   <a:srgbClr val="7F7F7F"/>
                 </a:solidFill>
               </a:rPr>
-              <a:t>Capture d’écran du versioning sous </a:t>
+              <a:t>sous </a:t>
             </a:r>
             <a:r>
               <a:rPr lang="fr-FR" sz="2400" dirty="0" err="1">
@@ -23142,6 +23520,35 @@
           </a:p>
         </p:txBody>
       </p:sp>
+      <p:pic>
+        <p:nvPicPr>
+          <p:cNvPr id="5" name="Image 4"/>
+          <p:cNvPicPr>
+            <a:picLocks noChangeAspect="1"/>
+          </p:cNvPicPr>
+          <p:nvPr/>
+        </p:nvPicPr>
+        <p:blipFill rotWithShape="1">
+          <a:blip r:embed="rId2">
+            <a:extLst>
+              <a:ext uri="{28A0092B-C50C-407E-A947-70E740481C1C}">
+                <a14:useLocalDpi xmlns:a14="http://schemas.microsoft.com/office/drawing/2010/main" val="0"/>
+              </a:ext>
+            </a:extLst>
+          </a:blip>
+          <a:srcRect t="8887" r="3521"/>
+          <a:stretch/>
+        </p:blipFill>
+        <p:spPr>
+          <a:xfrm>
+            <a:off x="4995728" y="1350718"/>
+            <a:ext cx="2306594" cy="4755800"/>
+          </a:xfrm>
+          <a:prstGeom prst="rect">
+            <a:avLst/>
+          </a:prstGeom>
+        </p:spPr>
+      </p:pic>
     </p:spTree>
     <p:extLst>
       <p:ext uri="{BB962C8B-B14F-4D97-AF65-F5344CB8AC3E}">
@@ -23152,6 +23559,13 @@
   <p:clrMapOvr>
     <a:masterClrMapping/>
   </p:clrMapOvr>
+  <p:timing>
+    <p:tnLst>
+      <p:par>
+        <p:cTn id="1" dur="indefinite" restart="never" nodeType="tmRoot"/>
+      </p:par>
+    </p:tnLst>
+  </p:timing>
 </p:sld>
 </file>
 

</xml_diff>